<commit_message>
Update HevLib Equipment and Slot handling.pptx
</commit_message>
<xml_diff>
--- a/examples and documentation/equipment/HevLib Equipment and Slot handling.pptx
+++ b/examples and documentation/equipment/HevLib Equipment and Slot handling.pptx
@@ -134,7 +134,7 @@
   <pc:docChgLst>
     <pc:chgData name="Ben Buckhurst" userId="e27bcf5138034369" providerId="LiveId" clId="{9E212467-FDA6-445C-9971-485D2ABE6995}"/>
     <pc:docChg chg="undo redo custSel addSld delSld modSld sldOrd">
-      <pc:chgData name="Ben Buckhurst" userId="e27bcf5138034369" providerId="LiveId" clId="{9E212467-FDA6-445C-9971-485D2ABE6995}" dt="2025-05-13T17:24:00.017" v="17861" actId="20577"/>
+      <pc:chgData name="Ben Buckhurst" userId="e27bcf5138034369" providerId="LiveId" clId="{9E212467-FDA6-445C-9971-485D2ABE6995}" dt="2025-05-13T23:40:57.877" v="17921" actId="20577"/>
       <pc:docMkLst>
         <pc:docMk/>
       </pc:docMkLst>
@@ -857,7 +857,7 @@
         </pc:spChg>
       </pc:sldChg>
       <pc:sldChg chg="addSp delSp modSp new mod">
-        <pc:chgData name="Ben Buckhurst" userId="e27bcf5138034369" providerId="LiveId" clId="{9E212467-FDA6-445C-9971-485D2ABE6995}" dt="2025-05-12T19:27:43.636" v="12226" actId="20577"/>
+        <pc:chgData name="Ben Buckhurst" userId="e27bcf5138034369" providerId="LiveId" clId="{9E212467-FDA6-445C-9971-485D2ABE6995}" dt="2025-05-13T23:40:57.877" v="17921" actId="20577"/>
         <pc:sldMkLst>
           <pc:docMk/>
           <pc:sldMk cId="1671271594" sldId="258"/>
@@ -871,7 +871,7 @@
           </ac:spMkLst>
         </pc:spChg>
         <pc:spChg chg="add mod">
-          <ac:chgData name="Ben Buckhurst" userId="e27bcf5138034369" providerId="LiveId" clId="{9E212467-FDA6-445C-9971-485D2ABE6995}" dt="2025-05-12T19:27:43.636" v="12226" actId="20577"/>
+          <ac:chgData name="Ben Buckhurst" userId="e27bcf5138034369" providerId="LiveId" clId="{9E212467-FDA6-445C-9971-485D2ABE6995}" dt="2025-05-13T23:40:57.877" v="17921" actId="20577"/>
           <ac:spMkLst>
             <pc:docMk/>
             <pc:sldMk cId="1671271594" sldId="258"/>
@@ -1144,13 +1144,13 @@
         </pc:spChg>
       </pc:sldChg>
       <pc:sldChg chg="modSp add mod">
-        <pc:chgData name="Ben Buckhurst" userId="e27bcf5138034369" providerId="LiveId" clId="{9E212467-FDA6-445C-9971-485D2ABE6995}" dt="2025-05-13T16:12:01.462" v="15965"/>
+        <pc:chgData name="Ben Buckhurst" userId="e27bcf5138034369" providerId="LiveId" clId="{9E212467-FDA6-445C-9971-485D2ABE6995}" dt="2025-05-13T18:27:02.241" v="17920" actId="20577"/>
         <pc:sldMkLst>
           <pc:docMk/>
           <pc:sldMk cId="4179589599" sldId="266"/>
         </pc:sldMkLst>
         <pc:spChg chg="mod">
-          <ac:chgData name="Ben Buckhurst" userId="e27bcf5138034369" providerId="LiveId" clId="{9E212467-FDA6-445C-9971-485D2ABE6995}" dt="2025-05-13T16:12:01.462" v="15965"/>
+          <ac:chgData name="Ben Buckhurst" userId="e27bcf5138034369" providerId="LiveId" clId="{9E212467-FDA6-445C-9971-485D2ABE6995}" dt="2025-05-13T18:27:02.241" v="17920" actId="20577"/>
           <ac:spMkLst>
             <pc:docMk/>
             <pc:sldMk cId="4179589599" sldId="266"/>
@@ -4674,13 +4674,8 @@
           <a:p>
             <a:r>
               <a:rPr lang="en-GB" sz="1200" dirty="0"/>
-              <a:t>This slideshow provides slides for explaining the parts of the data used by these variables, as well as code examples that show a mod main that purely involves the specific tag. These examples can be combined, and for cases like ADD_EQUIPMENT_SLOTS and ADD_EQUIPMENT_ITEMS, the Equipment.gd pointer needs only be referenced once; reminder that those variables require the dictionaries to pass through the pointer due to the way the data is handled at an internal level, and helper functions have been provided </a:t>
-            </a:r>
-            <a:r>
-              <a:rPr lang="en-GB" sz="1200"/>
-              <a:t>for them.</a:t>
-            </a:r>
-            <a:endParaRPr lang="en-GB" sz="1200" dirty="0"/>
+              <a:t>This slideshow provides slides for explaining the parts of the data used by these variables, as well as code examples that show a mod main that purely involves the specific tag. These examples can be combined, and for cases like ADD_EQUIPMENT_SLOTS and ADD_EQUIPMENT_ITEMS, the Equipment.gd pointer needs only be referenced once; reminder that those variables require the dictionaries to pass through the pointer due to the way the data is handled at an internal level, and helper functions have been provided for them.</a:t>
+            </a:r>
           </a:p>
         </p:txBody>
       </p:sp>
@@ -7941,25 +7936,11 @@
               <a:t> dictionary. Defaults to </a:t>
             </a:r>
             <a:r>
-              <a:rPr lang="en-GB" sz="1200" dirty="0">
-                <a:latin typeface="Courier New" panose="02070309020205020404" pitchFamily="49" charset="0"/>
-                <a:cs typeface="Courier New" panose="02070309020205020404" pitchFamily="49" charset="0"/>
-              </a:rPr>
-              <a:t>"</a:t>
-            </a:r>
-            <a:r>
-              <a:rPr lang="en-US" sz="1200" dirty="0">
-                <a:latin typeface="Courier New" panose="02070309020205020404" pitchFamily="49" charset="0"/>
-                <a:cs typeface="Courier New" panose="02070309020205020404" pitchFamily="49" charset="0"/>
-              </a:rPr>
-              <a:t>HARDPOINT</a:t>
-            </a:r>
-            <a:r>
-              <a:rPr lang="en-GB" sz="1200" dirty="0">
-                <a:latin typeface="Courier New" panose="02070309020205020404" pitchFamily="49" charset="0"/>
-                <a:cs typeface="Courier New" panose="02070309020205020404" pitchFamily="49" charset="0"/>
-              </a:rPr>
-              <a:t>"</a:t>
+              <a:rPr lang="en-GB" sz="1200">
+                <a:latin typeface="Courier New" panose="02070309020205020404" pitchFamily="49" charset="0"/>
+                <a:cs typeface="Courier New" panose="02070309020205020404" pitchFamily="49" charset="0"/>
+              </a:rPr>
+              <a:t>""</a:t>
             </a:r>
             <a:endParaRPr lang="en-US" sz="1200" dirty="0">
               <a:latin typeface="Courier New" panose="02070309020205020404" pitchFamily="49" charset="0"/>
@@ -13420,7 +13401,7 @@
                 <a:latin typeface="Courier New" panose="02070309020205020404" pitchFamily="49" charset="0"/>
                 <a:cs typeface="Courier New" panose="02070309020205020404" pitchFamily="49" charset="0"/>
               </a:rPr>
-              <a:t>		"</a:t>
+              <a:t>					"</a:t>
             </a:r>
             <a:r>
               <a:rPr lang="en-US" sz="1100" dirty="0" err="1">

</xml_diff>